<commit_message>
Actualizacion links ppt y archivo colab
</commit_message>
<xml_diff>
--- a/Challenge/slides/02. Challenge - Data Science II - Pre-entrega.pptx
+++ b/Challenge/slides/02. Challenge - Data Science II - Pre-entrega.pptx
@@ -7934,14 +7934,14 @@
               <a:buNone/>
             </a:pPr>
             <a:r>
-              <a:rPr lang="es-419" b="1" dirty="0" err="1">
+              <a:rPr lang="es-419" b="1" dirty="0">
                 <a:latin typeface="Montserrat"/>
                 <a:ea typeface="Montserrat"/>
                 <a:cs typeface="Montserrat"/>
                 <a:sym typeface="Montserrat"/>
                 <a:hlinkClick r:id="rId3"/>
               </a:rPr>
-              <a:t>Github</a:t>
+              <a:t>GitHub</a:t>
             </a:r>
             <a:r>
               <a:rPr lang="es-419" dirty="0">

</xml_diff>